<commit_message>
Fixing pv syntax error and adding record 2 channel mapping
</commit_message>
<xml_diff>
--- a/presentations/1 CS-Studio - Probe.pptx
+++ b/presentations/1 CS-Studio - Probe.pptx
@@ -210,7 +210,7 @@
           <a:p>
             <a:fld id="{D9966FA8-7494-476B-82FA-6423FAB21465}" type="datetimeFigureOut">
               <a:rPr lang="en-US" smtClean="0"/>
-              <a:t>3/21/2016</a:t>
+              <a:t>5/16/2016</a:t>
             </a:fld>
             <a:endParaRPr lang="en-US"/>
           </a:p>
@@ -809,7 +809,7 @@
           <a:p>
             <a:fld id="{6222EF03-A9AE-4AF1-9CC5-BDF342F0A591}" type="datetimeFigureOut">
               <a:rPr lang="en-US" smtClean="0"/>
-              <a:t>3/21/2016</a:t>
+              <a:t>5/16/2016</a:t>
             </a:fld>
             <a:endParaRPr lang="en-US"/>
           </a:p>
@@ -979,7 +979,7 @@
           <a:p>
             <a:fld id="{6222EF03-A9AE-4AF1-9CC5-BDF342F0A591}" type="datetimeFigureOut">
               <a:rPr lang="en-US" smtClean="0"/>
-              <a:t>3/21/2016</a:t>
+              <a:t>5/16/2016</a:t>
             </a:fld>
             <a:endParaRPr lang="en-US"/>
           </a:p>
@@ -1159,7 +1159,7 @@
           <a:p>
             <a:fld id="{6222EF03-A9AE-4AF1-9CC5-BDF342F0A591}" type="datetimeFigureOut">
               <a:rPr lang="en-US" smtClean="0"/>
-              <a:t>3/21/2016</a:t>
+              <a:t>5/16/2016</a:t>
             </a:fld>
             <a:endParaRPr lang="en-US"/>
           </a:p>
@@ -1329,7 +1329,7 @@
           <a:p>
             <a:fld id="{6222EF03-A9AE-4AF1-9CC5-BDF342F0A591}" type="datetimeFigureOut">
               <a:rPr lang="en-US" smtClean="0"/>
-              <a:t>3/21/2016</a:t>
+              <a:t>5/16/2016</a:t>
             </a:fld>
             <a:endParaRPr lang="en-US"/>
           </a:p>
@@ -1575,7 +1575,7 @@
           <a:p>
             <a:fld id="{6222EF03-A9AE-4AF1-9CC5-BDF342F0A591}" type="datetimeFigureOut">
               <a:rPr lang="en-US" smtClean="0"/>
-              <a:t>3/21/2016</a:t>
+              <a:t>5/16/2016</a:t>
             </a:fld>
             <a:endParaRPr lang="en-US"/>
           </a:p>
@@ -1807,7 +1807,7 @@
           <a:p>
             <a:fld id="{6222EF03-A9AE-4AF1-9CC5-BDF342F0A591}" type="datetimeFigureOut">
               <a:rPr lang="en-US" smtClean="0"/>
-              <a:t>3/21/2016</a:t>
+              <a:t>5/16/2016</a:t>
             </a:fld>
             <a:endParaRPr lang="en-US"/>
           </a:p>
@@ -2174,7 +2174,7 @@
           <a:p>
             <a:fld id="{6222EF03-A9AE-4AF1-9CC5-BDF342F0A591}" type="datetimeFigureOut">
               <a:rPr lang="en-US" smtClean="0"/>
-              <a:t>3/21/2016</a:t>
+              <a:t>5/16/2016</a:t>
             </a:fld>
             <a:endParaRPr lang="en-US"/>
           </a:p>
@@ -2292,7 +2292,7 @@
           <a:p>
             <a:fld id="{6222EF03-A9AE-4AF1-9CC5-BDF342F0A591}" type="datetimeFigureOut">
               <a:rPr lang="en-US" smtClean="0"/>
-              <a:t>3/21/2016</a:t>
+              <a:t>5/16/2016</a:t>
             </a:fld>
             <a:endParaRPr lang="en-US"/>
           </a:p>
@@ -2387,7 +2387,7 @@
           <a:p>
             <a:fld id="{6222EF03-A9AE-4AF1-9CC5-BDF342F0A591}" type="datetimeFigureOut">
               <a:rPr lang="en-US" smtClean="0"/>
-              <a:t>3/21/2016</a:t>
+              <a:t>5/16/2016</a:t>
             </a:fld>
             <a:endParaRPr lang="en-US"/>
           </a:p>
@@ -2664,7 +2664,7 @@
           <a:p>
             <a:fld id="{6222EF03-A9AE-4AF1-9CC5-BDF342F0A591}" type="datetimeFigureOut">
               <a:rPr lang="en-US" smtClean="0"/>
-              <a:t>3/21/2016</a:t>
+              <a:t>5/16/2016</a:t>
             </a:fld>
             <a:endParaRPr lang="en-US"/>
           </a:p>
@@ -2917,7 +2917,7 @@
           <a:p>
             <a:fld id="{6222EF03-A9AE-4AF1-9CC5-BDF342F0A591}" type="datetimeFigureOut">
               <a:rPr lang="en-US" smtClean="0"/>
-              <a:t>3/21/2016</a:t>
+              <a:t>5/16/2016</a:t>
             </a:fld>
             <a:endParaRPr lang="en-US"/>
           </a:p>
@@ -3130,7 +3130,7 @@
           <a:p>
             <a:fld id="{6222EF03-A9AE-4AF1-9CC5-BDF342F0A591}" type="datetimeFigureOut">
               <a:rPr lang="en-US" smtClean="0"/>
-              <a:t>3/21/2016</a:t>
+              <a:t>5/16/2016</a:t>
             </a:fld>
             <a:endParaRPr lang="en-US"/>
           </a:p>
@@ -3662,11 +3662,7 @@
           <a:p>
             <a:r>
               <a:rPr lang="en-US" dirty="0" smtClean="0"/>
-              <a:t>Probe </a:t>
-            </a:r>
-            <a:r>
-              <a:rPr lang="en-US" dirty="0" smtClean="0"/>
-              <a:t>– process variable (</a:t>
+              <a:t>Probe – process variable (</a:t>
             </a:r>
             <a:r>
               <a:rPr lang="en-US" dirty="0" err="1" smtClean="0"/>
@@ -3734,7 +3730,6 @@
               <a:rPr lang="en-US" dirty="0" smtClean="0"/>
               <a:t>)</a:t>
             </a:r>
-            <a:endParaRPr lang="en-US" dirty="0" smtClean="0"/>
           </a:p>
           <a:p>
             <a:pPr lvl="1"/>
@@ -3754,7 +3749,6 @@
               <a:rPr lang="en-US" dirty="0" smtClean="0"/>
               <a:t>)</a:t>
             </a:r>
-            <a:endParaRPr lang="en-US" dirty="0" smtClean="0"/>
           </a:p>
           <a:p>
             <a:pPr lvl="1"/>
@@ -3774,7 +3768,6 @@
               <a:rPr lang="en-US" dirty="0" smtClean="0"/>
               <a:t>)</a:t>
             </a:r>
-            <a:endParaRPr lang="en-US" dirty="0" smtClean="0"/>
           </a:p>
           <a:p>
             <a:pPr lvl="1"/>
@@ -3809,7 +3802,6 @@
               <a:rPr lang="en-US" dirty="0" smtClean="0"/>
               <a:t>)</a:t>
             </a:r>
-            <a:endParaRPr lang="en-US" dirty="0" smtClean="0"/>
           </a:p>
           <a:p>
             <a:pPr lvl="1"/>
@@ -5379,6 +5371,13 @@
             </a:r>
             <a:r>
               <a:rPr lang="en-US" dirty="0"/>
+              <a:t/>
+            </a:r>
+            <a:br>
+              <a:rPr lang="en-US" dirty="0"/>
+            </a:br>
+            <a:r>
+              <a:rPr lang="en-US" dirty="0" smtClean="0"/>
               <a:t>“</a:t>
             </a:r>
             <a:r>

</xml_diff>